<commit_message>
Update: hierachy - 수정
</commit_message>
<xml_diff>
--- a/documents/hierachy.pptx
+++ b/documents/hierachy.pptx
@@ -4618,7 +4618,7 @@
         </p:nvSpPr>
         <p:spPr>
           <a:xfrm>
-            <a:off x="4904873" y="97051"/>
+            <a:off x="4904873" y="690175"/>
             <a:ext cx="2382253" cy="938463"/>
           </a:xfrm>
           <a:prstGeom prst="rect">
@@ -4667,7 +4667,7 @@
         </p:nvSpPr>
         <p:spPr>
           <a:xfrm>
-            <a:off x="6344153" y="1504748"/>
+            <a:off x="6344153" y="2097872"/>
             <a:ext cx="2382253" cy="938463"/>
           </a:xfrm>
           <a:prstGeom prst="rect">
@@ -4716,7 +4716,7 @@
         </p:nvSpPr>
         <p:spPr>
           <a:xfrm>
-            <a:off x="388019" y="1504748"/>
+            <a:off x="388019" y="2097872"/>
             <a:ext cx="2541570" cy="938463"/>
           </a:xfrm>
           <a:prstGeom prst="rect">
@@ -4746,7 +4746,7 @@
             <a:pPr algn="ctr"/>
             <a:r>
               <a:rPr lang="en-US" altLang="ko-KR" dirty="0"/>
-              <a:t>arithmetic equation</a:t>
+              <a:t>arithmetic assignment</a:t>
             </a:r>
           </a:p>
         </p:txBody>
@@ -4765,7 +4765,7 @@
         </p:nvSpPr>
         <p:spPr>
           <a:xfrm>
-            <a:off x="3445744" y="1504746"/>
+            <a:off x="3445744" y="2097870"/>
             <a:ext cx="2382253" cy="938463"/>
           </a:xfrm>
           <a:prstGeom prst="rect">
@@ -4814,7 +4814,7 @@
         </p:nvSpPr>
         <p:spPr>
           <a:xfrm>
-            <a:off x="9203357" y="1504748"/>
+            <a:off x="9203357" y="2097872"/>
             <a:ext cx="2382253" cy="938463"/>
           </a:xfrm>
           <a:prstGeom prst="rect">
@@ -4863,7 +4863,7 @@
         </p:nvSpPr>
         <p:spPr>
           <a:xfrm>
-            <a:off x="388019" y="2443211"/>
+            <a:off x="388019" y="3036335"/>
             <a:ext cx="2541570" cy="3217993"/>
           </a:xfrm>
           <a:prstGeom prst="rect">
@@ -4954,7 +4954,7 @@
         </p:nvSpPr>
         <p:spPr>
           <a:xfrm>
-            <a:off x="6344153" y="2443211"/>
+            <a:off x="6344153" y="3036335"/>
             <a:ext cx="2382252" cy="3217993"/>
           </a:xfrm>
           <a:prstGeom prst="rect">
@@ -5034,7 +5034,7 @@
         </p:nvSpPr>
         <p:spPr>
           <a:xfrm>
-            <a:off x="3445745" y="2443207"/>
+            <a:off x="3445745" y="3036331"/>
             <a:ext cx="2382252" cy="3217993"/>
           </a:xfrm>
           <a:prstGeom prst="rect">
@@ -5124,7 +5124,15 @@
             </a:r>
             <a:r>
               <a:rPr lang="en-US" altLang="ko-KR" dirty="0"/>
-              <a:t>? or just bool variable)</a:t>
+              <a:t>? or just </a:t>
+            </a:r>
+            <a:r>
+              <a:rPr lang="en-US" altLang="ko-KR" dirty="0" err="1"/>
+              <a:t>boolean</a:t>
+            </a:r>
+            <a:r>
+              <a:rPr lang="en-US" altLang="ko-KR" dirty="0"/>
+              <a:t>?)</a:t>
             </a:r>
           </a:p>
         </p:txBody>
@@ -5143,7 +5151,7 @@
         </p:nvSpPr>
         <p:spPr>
           <a:xfrm>
-            <a:off x="9203358" y="2443209"/>
+            <a:off x="9203358" y="3036333"/>
             <a:ext cx="2382252" cy="3217993"/>
           </a:xfrm>
           <a:prstGeom prst="rect">
@@ -5223,7 +5231,7 @@
         </p:nvSpPr>
         <p:spPr>
           <a:xfrm>
-            <a:off x="7652084" y="5986913"/>
+            <a:off x="7639728" y="6488668"/>
             <a:ext cx="3488455" cy="369332"/>
           </a:xfrm>
           <a:prstGeom prst="rect">
@@ -5273,6 +5281,247 @@
           </a:p>
         </p:txBody>
       </p:sp>
+      <p:cxnSp>
+        <p:nvCxnSpPr>
+          <p:cNvPr id="19" name="직선 연결선 18">
+            <a:extLst>
+              <a:ext uri="{FF2B5EF4-FFF2-40B4-BE49-F238E27FC236}">
+                <a16:creationId xmlns:a16="http://schemas.microsoft.com/office/drawing/2014/main" id="{C5074CF5-9628-40FA-BD03-1374BAF9A11A}"/>
+              </a:ext>
+            </a:extLst>
+          </p:cNvPr>
+          <p:cNvCxnSpPr>
+            <a:stCxn id="6" idx="0"/>
+          </p:cNvCxnSpPr>
+          <p:nvPr/>
+        </p:nvCxnSpPr>
+        <p:spPr>
+          <a:xfrm flipV="1">
+            <a:off x="1658804" y="1628638"/>
+            <a:ext cx="3246069" cy="469234"/>
+          </a:xfrm>
+          <a:prstGeom prst="line">
+            <a:avLst/>
+          </a:prstGeom>
+        </p:spPr>
+        <p:style>
+          <a:lnRef idx="1">
+            <a:schemeClr val="accent1"/>
+          </a:lnRef>
+          <a:fillRef idx="0">
+            <a:schemeClr val="accent1"/>
+          </a:fillRef>
+          <a:effectRef idx="0">
+            <a:schemeClr val="accent1"/>
+          </a:effectRef>
+          <a:fontRef idx="minor">
+            <a:schemeClr val="tx1"/>
+          </a:fontRef>
+        </p:style>
+      </p:cxnSp>
+      <p:cxnSp>
+        <p:nvCxnSpPr>
+          <p:cNvPr id="21" name="직선 연결선 20">
+            <a:extLst>
+              <a:ext uri="{FF2B5EF4-FFF2-40B4-BE49-F238E27FC236}">
+                <a16:creationId xmlns:a16="http://schemas.microsoft.com/office/drawing/2014/main" id="{6DF347DD-E38F-4571-B965-70FFB6A5C594}"/>
+              </a:ext>
+            </a:extLst>
+          </p:cNvPr>
+          <p:cNvCxnSpPr>
+            <a:stCxn id="7" idx="0"/>
+          </p:cNvCxnSpPr>
+          <p:nvPr/>
+        </p:nvCxnSpPr>
+        <p:spPr>
+          <a:xfrm flipV="1">
+            <a:off x="4636871" y="1628638"/>
+            <a:ext cx="923670" cy="469232"/>
+          </a:xfrm>
+          <a:prstGeom prst="line">
+            <a:avLst/>
+          </a:prstGeom>
+        </p:spPr>
+        <p:style>
+          <a:lnRef idx="1">
+            <a:schemeClr val="accent1"/>
+          </a:lnRef>
+          <a:fillRef idx="0">
+            <a:schemeClr val="accent1"/>
+          </a:fillRef>
+          <a:effectRef idx="0">
+            <a:schemeClr val="accent1"/>
+          </a:effectRef>
+          <a:fontRef idx="minor">
+            <a:schemeClr val="tx1"/>
+          </a:fontRef>
+        </p:style>
+      </p:cxnSp>
+      <p:cxnSp>
+        <p:nvCxnSpPr>
+          <p:cNvPr id="22" name="직선 연결선 21">
+            <a:extLst>
+              <a:ext uri="{FF2B5EF4-FFF2-40B4-BE49-F238E27FC236}">
+                <a16:creationId xmlns:a16="http://schemas.microsoft.com/office/drawing/2014/main" id="{1A4961B0-3F92-4C1C-B59A-0679CACE008B}"/>
+              </a:ext>
+            </a:extLst>
+          </p:cNvPr>
+          <p:cNvCxnSpPr>
+            <a:cxnSpLocks/>
+            <a:stCxn id="5" idx="0"/>
+          </p:cNvCxnSpPr>
+          <p:nvPr/>
+        </p:nvCxnSpPr>
+        <p:spPr>
+          <a:xfrm flipH="1" flipV="1">
+            <a:off x="6344153" y="1628638"/>
+            <a:ext cx="1191127" cy="469234"/>
+          </a:xfrm>
+          <a:prstGeom prst="line">
+            <a:avLst/>
+          </a:prstGeom>
+        </p:spPr>
+        <p:style>
+          <a:lnRef idx="1">
+            <a:schemeClr val="accent1"/>
+          </a:lnRef>
+          <a:fillRef idx="0">
+            <a:schemeClr val="accent1"/>
+          </a:fillRef>
+          <a:effectRef idx="0">
+            <a:schemeClr val="accent1"/>
+          </a:effectRef>
+          <a:fontRef idx="minor">
+            <a:schemeClr val="tx1"/>
+          </a:fontRef>
+        </p:style>
+      </p:cxnSp>
+      <p:cxnSp>
+        <p:nvCxnSpPr>
+          <p:cNvPr id="25" name="직선 연결선 24">
+            <a:extLst>
+              <a:ext uri="{FF2B5EF4-FFF2-40B4-BE49-F238E27FC236}">
+                <a16:creationId xmlns:a16="http://schemas.microsoft.com/office/drawing/2014/main" id="{1106CA1F-AD44-446C-B4A5-0D9093A1AF94}"/>
+              </a:ext>
+            </a:extLst>
+          </p:cNvPr>
+          <p:cNvCxnSpPr>
+            <a:cxnSpLocks/>
+          </p:cNvCxnSpPr>
+          <p:nvPr/>
+        </p:nvCxnSpPr>
+        <p:spPr>
+          <a:xfrm flipH="1" flipV="1">
+            <a:off x="7287126" y="1628638"/>
+            <a:ext cx="3246069" cy="469232"/>
+          </a:xfrm>
+          <a:prstGeom prst="line">
+            <a:avLst/>
+          </a:prstGeom>
+        </p:spPr>
+        <p:style>
+          <a:lnRef idx="1">
+            <a:schemeClr val="accent1"/>
+          </a:lnRef>
+          <a:fillRef idx="0">
+            <a:schemeClr val="accent1"/>
+          </a:fillRef>
+          <a:effectRef idx="0">
+            <a:schemeClr val="accent1"/>
+          </a:effectRef>
+          <a:fontRef idx="minor">
+            <a:schemeClr val="tx1"/>
+          </a:fontRef>
+        </p:style>
+      </p:cxnSp>
+      <p:sp>
+        <p:nvSpPr>
+          <p:cNvPr id="28" name="직사각형 27">
+            <a:extLst>
+              <a:ext uri="{FF2B5EF4-FFF2-40B4-BE49-F238E27FC236}">
+                <a16:creationId xmlns:a16="http://schemas.microsoft.com/office/drawing/2014/main" id="{3B6C7AFF-6879-4E51-AEEA-DD7A27C82F79}"/>
+              </a:ext>
+            </a:extLst>
+          </p:cNvPr>
+          <p:cNvSpPr/>
+          <p:nvPr/>
+        </p:nvSpPr>
+        <p:spPr>
+          <a:xfrm>
+            <a:off x="854544" y="356543"/>
+            <a:ext cx="2259360" cy="938463"/>
+          </a:xfrm>
+          <a:prstGeom prst="rect">
+            <a:avLst/>
+          </a:prstGeom>
+        </p:spPr>
+        <p:style>
+          <a:lnRef idx="2">
+            <a:schemeClr val="accent1">
+              <a:shade val="50000"/>
+            </a:schemeClr>
+          </a:lnRef>
+          <a:fillRef idx="1">
+            <a:schemeClr val="accent1"/>
+          </a:fillRef>
+          <a:effectRef idx="0">
+            <a:schemeClr val="accent1"/>
+          </a:effectRef>
+          <a:fontRef idx="minor">
+            <a:schemeClr val="lt1"/>
+          </a:fontRef>
+        </p:style>
+        <p:txBody>
+          <a:bodyPr rtlCol="0" anchor="ctr"/>
+          <a:lstStyle/>
+          <a:p>
+            <a:pPr algn="ctr"/>
+            <a:r>
+              <a:rPr lang="en-US" altLang="ko-KR" dirty="0"/>
+              <a:t>declare variable</a:t>
+            </a:r>
+          </a:p>
+        </p:txBody>
+      </p:sp>
+      <p:cxnSp>
+        <p:nvCxnSpPr>
+          <p:cNvPr id="29" name="직선 연결선 28">
+            <a:extLst>
+              <a:ext uri="{FF2B5EF4-FFF2-40B4-BE49-F238E27FC236}">
+                <a16:creationId xmlns:a16="http://schemas.microsoft.com/office/drawing/2014/main" id="{361704E2-33A9-4DBD-BEF5-B636AD178C2D}"/>
+              </a:ext>
+            </a:extLst>
+          </p:cNvPr>
+          <p:cNvCxnSpPr>
+            <a:cxnSpLocks/>
+            <a:stCxn id="28" idx="3"/>
+          </p:cNvCxnSpPr>
+          <p:nvPr/>
+        </p:nvCxnSpPr>
+        <p:spPr>
+          <a:xfrm>
+            <a:off x="3113904" y="825775"/>
+            <a:ext cx="1791850" cy="351923"/>
+          </a:xfrm>
+          <a:prstGeom prst="line">
+            <a:avLst/>
+          </a:prstGeom>
+        </p:spPr>
+        <p:style>
+          <a:lnRef idx="1">
+            <a:schemeClr val="accent1"/>
+          </a:lnRef>
+          <a:fillRef idx="0">
+            <a:schemeClr val="accent1"/>
+          </a:fillRef>
+          <a:effectRef idx="0">
+            <a:schemeClr val="accent1"/>
+          </a:effectRef>
+          <a:fontRef idx="minor">
+            <a:schemeClr val="tx1"/>
+          </a:fontRef>
+        </p:style>
+      </p:cxnSp>
     </p:spTree>
     <p:extLst>
       <p:ext uri="{BB962C8B-B14F-4D97-AF65-F5344CB8AC3E}">
@@ -5303,42 +5552,856 @@
           <a:chExt cx="0" cy="0"/>
         </a:xfrm>
       </p:grpSpPr>
-      <p:pic>
-        <p:nvPicPr>
-          <p:cNvPr id="3" name="그림 2">
-            <a:extLst>
-              <a:ext uri="{FF2B5EF4-FFF2-40B4-BE49-F238E27FC236}">
-                <a16:creationId xmlns:a16="http://schemas.microsoft.com/office/drawing/2014/main" id="{A0AC73C8-2CAE-48D3-AC19-3B3A7E8D6C29}"/>
-              </a:ext>
-            </a:extLst>
-          </p:cNvPr>
-          <p:cNvPicPr>
-            <a:picLocks noChangeAspect="1"/>
-          </p:cNvPicPr>
+      <p:sp>
+        <p:nvSpPr>
+          <p:cNvPr id="14" name="직사각형 13">
+            <a:extLst>
+              <a:ext uri="{FF2B5EF4-FFF2-40B4-BE49-F238E27FC236}">
+                <a16:creationId xmlns:a16="http://schemas.microsoft.com/office/drawing/2014/main" id="{AA47AC8E-5D8F-4E7B-9BB7-77DD7A8CF5BA}"/>
+              </a:ext>
+            </a:extLst>
+          </p:cNvPr>
+          <p:cNvSpPr/>
           <p:nvPr/>
-        </p:nvPicPr>
-        <p:blipFill>
-          <a:blip r:embed="rId2"/>
-          <a:stretch>
-            <a:fillRect/>
-          </a:stretch>
-        </p:blipFill>
-        <p:spPr>
-          <a:xfrm>
-            <a:off x="109086" y="-96253"/>
-            <a:ext cx="7340867" cy="5505651"/>
+        </p:nvSpPr>
+        <p:spPr>
+          <a:xfrm>
+            <a:off x="475750" y="3690485"/>
+            <a:ext cx="7581699" cy="2950946"/>
           </a:xfrm>
           <a:prstGeom prst="rect">
             <a:avLst/>
           </a:prstGeom>
         </p:spPr>
-      </p:pic>
-      <p:sp>
-        <p:nvSpPr>
-          <p:cNvPr id="9" name="TextBox 8">
-            <a:extLst>
-              <a:ext uri="{FF2B5EF4-FFF2-40B4-BE49-F238E27FC236}">
-                <a16:creationId xmlns:a16="http://schemas.microsoft.com/office/drawing/2014/main" id="{3CEC2AF4-8758-4A98-A991-5DCB7F492B18}"/>
+        <p:style>
+          <a:lnRef idx="2">
+            <a:schemeClr val="accent1">
+              <a:shade val="50000"/>
+            </a:schemeClr>
+          </a:lnRef>
+          <a:fillRef idx="1">
+            <a:schemeClr val="accent1"/>
+          </a:fillRef>
+          <a:effectRef idx="0">
+            <a:schemeClr val="accent1"/>
+          </a:effectRef>
+          <a:fontRef idx="minor">
+            <a:schemeClr val="lt1"/>
+          </a:fontRef>
+        </p:style>
+        <p:txBody>
+          <a:bodyPr rtlCol="0" anchor="ctr"/>
+          <a:lstStyle/>
+          <a:p>
+            <a:pPr algn="ctr"/>
+            <a:endParaRPr lang="en-US" altLang="ko-KR" dirty="0"/>
+          </a:p>
+        </p:txBody>
+      </p:sp>
+      <p:sp>
+        <p:nvSpPr>
+          <p:cNvPr id="22" name="직사각형 21">
+            <a:extLst>
+              <a:ext uri="{FF2B5EF4-FFF2-40B4-BE49-F238E27FC236}">
+                <a16:creationId xmlns:a16="http://schemas.microsoft.com/office/drawing/2014/main" id="{314C98ED-60BC-4F53-939E-746B2779423A}"/>
+              </a:ext>
+            </a:extLst>
+          </p:cNvPr>
+          <p:cNvSpPr/>
+          <p:nvPr/>
+        </p:nvSpPr>
+        <p:spPr>
+          <a:xfrm>
+            <a:off x="475749" y="284348"/>
+            <a:ext cx="7581699" cy="2950946"/>
+          </a:xfrm>
+          <a:prstGeom prst="rect">
+            <a:avLst/>
+          </a:prstGeom>
+        </p:spPr>
+        <p:style>
+          <a:lnRef idx="2">
+            <a:schemeClr val="accent1">
+              <a:shade val="50000"/>
+            </a:schemeClr>
+          </a:lnRef>
+          <a:fillRef idx="1">
+            <a:schemeClr val="accent1"/>
+          </a:fillRef>
+          <a:effectRef idx="0">
+            <a:schemeClr val="accent1"/>
+          </a:effectRef>
+          <a:fontRef idx="minor">
+            <a:schemeClr val="lt1"/>
+          </a:fontRef>
+        </p:style>
+        <p:txBody>
+          <a:bodyPr rtlCol="0" anchor="ctr"/>
+          <a:lstStyle/>
+          <a:p>
+            <a:pPr algn="ctr"/>
+            <a:endParaRPr lang="en-US" altLang="ko-KR" dirty="0"/>
+          </a:p>
+        </p:txBody>
+      </p:sp>
+      <p:sp>
+        <p:nvSpPr>
+          <p:cNvPr id="23" name="직사각형 22">
+            <a:extLst>
+              <a:ext uri="{FF2B5EF4-FFF2-40B4-BE49-F238E27FC236}">
+                <a16:creationId xmlns:a16="http://schemas.microsoft.com/office/drawing/2014/main" id="{8D25CBD9-7FD5-4552-983D-F87C44DE09E6}"/>
+              </a:ext>
+            </a:extLst>
+          </p:cNvPr>
+          <p:cNvSpPr/>
+          <p:nvPr/>
+        </p:nvSpPr>
+        <p:spPr>
+          <a:xfrm>
+            <a:off x="883921" y="1355559"/>
+            <a:ext cx="1280160" cy="789272"/>
+          </a:xfrm>
+          <a:prstGeom prst="rect">
+            <a:avLst/>
+          </a:prstGeom>
+        </p:spPr>
+        <p:style>
+          <a:lnRef idx="0">
+            <a:schemeClr val="accent4"/>
+          </a:lnRef>
+          <a:fillRef idx="3">
+            <a:schemeClr val="accent4"/>
+          </a:fillRef>
+          <a:effectRef idx="3">
+            <a:schemeClr val="accent4"/>
+          </a:effectRef>
+          <a:fontRef idx="minor">
+            <a:schemeClr val="lt1"/>
+          </a:fontRef>
+        </p:style>
+        <p:txBody>
+          <a:bodyPr rtlCol="0" anchor="ctr"/>
+          <a:lstStyle/>
+          <a:p>
+            <a:pPr algn="ctr"/>
+            <a:r>
+              <a:rPr lang="en-US" altLang="ko-KR" dirty="0"/>
+              <a:t>A</a:t>
+            </a:r>
+            <a:endParaRPr lang="ko-KR" altLang="en-US" dirty="0"/>
+          </a:p>
+        </p:txBody>
+      </p:sp>
+      <p:sp>
+        <p:nvSpPr>
+          <p:cNvPr id="24" name="직사각형 23">
+            <a:extLst>
+              <a:ext uri="{FF2B5EF4-FFF2-40B4-BE49-F238E27FC236}">
+                <a16:creationId xmlns:a16="http://schemas.microsoft.com/office/drawing/2014/main" id="{A9D05A3D-CFFB-4C7E-9204-85F62F644B65}"/>
+              </a:ext>
+            </a:extLst>
+          </p:cNvPr>
+          <p:cNvSpPr/>
+          <p:nvPr/>
+        </p:nvSpPr>
+        <p:spPr>
+          <a:xfrm>
+            <a:off x="3626520" y="1355559"/>
+            <a:ext cx="1280160" cy="789272"/>
+          </a:xfrm>
+          <a:prstGeom prst="rect">
+            <a:avLst/>
+          </a:prstGeom>
+        </p:spPr>
+        <p:style>
+          <a:lnRef idx="0">
+            <a:schemeClr val="accent6"/>
+          </a:lnRef>
+          <a:fillRef idx="3">
+            <a:schemeClr val="accent6"/>
+          </a:fillRef>
+          <a:effectRef idx="3">
+            <a:schemeClr val="accent6"/>
+          </a:effectRef>
+          <a:fontRef idx="minor">
+            <a:schemeClr val="lt1"/>
+          </a:fontRef>
+        </p:style>
+        <p:txBody>
+          <a:bodyPr rtlCol="0" anchor="ctr"/>
+          <a:lstStyle/>
+          <a:p>
+            <a:pPr algn="ctr"/>
+            <a:r>
+              <a:rPr lang="en-US" altLang="ko-KR" dirty="0"/>
+              <a:t>3</a:t>
+            </a:r>
+            <a:endParaRPr lang="ko-KR" altLang="en-US" dirty="0"/>
+          </a:p>
+        </p:txBody>
+      </p:sp>
+      <p:sp>
+        <p:nvSpPr>
+          <p:cNvPr id="25" name="직사각형 24">
+            <a:extLst>
+              <a:ext uri="{FF2B5EF4-FFF2-40B4-BE49-F238E27FC236}">
+                <a16:creationId xmlns:a16="http://schemas.microsoft.com/office/drawing/2014/main" id="{1691C00F-CD16-45C6-8790-6F25067808A2}"/>
+              </a:ext>
+            </a:extLst>
+          </p:cNvPr>
+          <p:cNvSpPr/>
+          <p:nvPr/>
+        </p:nvSpPr>
+        <p:spPr>
+          <a:xfrm>
+            <a:off x="2479308" y="1365185"/>
+            <a:ext cx="794083" cy="789272"/>
+          </a:xfrm>
+          <a:prstGeom prst="rect">
+            <a:avLst/>
+          </a:prstGeom>
+        </p:spPr>
+        <p:style>
+          <a:lnRef idx="0">
+            <a:schemeClr val="accent3"/>
+          </a:lnRef>
+          <a:fillRef idx="3">
+            <a:schemeClr val="accent3"/>
+          </a:fillRef>
+          <a:effectRef idx="3">
+            <a:schemeClr val="accent3"/>
+          </a:effectRef>
+          <a:fontRef idx="minor">
+            <a:schemeClr val="lt1"/>
+          </a:fontRef>
+        </p:style>
+        <p:txBody>
+          <a:bodyPr rtlCol="0" anchor="ctr"/>
+          <a:lstStyle/>
+          <a:p>
+            <a:pPr algn="ctr"/>
+            <a:r>
+              <a:rPr lang="en-US" altLang="ko-KR" dirty="0"/>
+              <a:t>+</a:t>
+            </a:r>
+            <a:endParaRPr lang="ko-KR" altLang="en-US" dirty="0"/>
+          </a:p>
+        </p:txBody>
+      </p:sp>
+      <p:sp>
+        <p:nvSpPr>
+          <p:cNvPr id="26" name="직사각형 25">
+            <a:extLst>
+              <a:ext uri="{FF2B5EF4-FFF2-40B4-BE49-F238E27FC236}">
+                <a16:creationId xmlns:a16="http://schemas.microsoft.com/office/drawing/2014/main" id="{CE1F4DE1-F7CE-44E7-B910-560B1CC36A2A}"/>
+              </a:ext>
+            </a:extLst>
+          </p:cNvPr>
+          <p:cNvSpPr/>
+          <p:nvPr/>
+        </p:nvSpPr>
+        <p:spPr>
+          <a:xfrm>
+            <a:off x="5259809" y="1365185"/>
+            <a:ext cx="794083" cy="789272"/>
+          </a:xfrm>
+          <a:prstGeom prst="rect">
+            <a:avLst/>
+          </a:prstGeom>
+        </p:spPr>
+        <p:style>
+          <a:lnRef idx="0">
+            <a:schemeClr val="accent3"/>
+          </a:lnRef>
+          <a:fillRef idx="3">
+            <a:schemeClr val="accent3"/>
+          </a:fillRef>
+          <a:effectRef idx="3">
+            <a:schemeClr val="accent3"/>
+          </a:effectRef>
+          <a:fontRef idx="minor">
+            <a:schemeClr val="lt1"/>
+          </a:fontRef>
+        </p:style>
+        <p:txBody>
+          <a:bodyPr rtlCol="0" anchor="ctr"/>
+          <a:lstStyle/>
+          <a:p>
+            <a:pPr algn="ctr"/>
+            <a:r>
+              <a:rPr lang="en-US" altLang="ko-KR" dirty="0"/>
+              <a:t>=&gt;</a:t>
+            </a:r>
+            <a:endParaRPr lang="ko-KR" altLang="en-US" dirty="0"/>
+          </a:p>
+        </p:txBody>
+      </p:sp>
+      <p:sp>
+        <p:nvSpPr>
+          <p:cNvPr id="27" name="직사각형 26">
+            <a:extLst>
+              <a:ext uri="{FF2B5EF4-FFF2-40B4-BE49-F238E27FC236}">
+                <a16:creationId xmlns:a16="http://schemas.microsoft.com/office/drawing/2014/main" id="{51398EE6-0B26-452D-A231-D638C845022D}"/>
+              </a:ext>
+            </a:extLst>
+          </p:cNvPr>
+          <p:cNvSpPr/>
+          <p:nvPr/>
+        </p:nvSpPr>
+        <p:spPr>
+          <a:xfrm>
+            <a:off x="6407021" y="1365185"/>
+            <a:ext cx="1280160" cy="789272"/>
+          </a:xfrm>
+          <a:prstGeom prst="rect">
+            <a:avLst/>
+          </a:prstGeom>
+        </p:spPr>
+        <p:style>
+          <a:lnRef idx="0">
+            <a:schemeClr val="accent2"/>
+          </a:lnRef>
+          <a:fillRef idx="3">
+            <a:schemeClr val="accent2"/>
+          </a:fillRef>
+          <a:effectRef idx="3">
+            <a:schemeClr val="accent2"/>
+          </a:effectRef>
+          <a:fontRef idx="minor">
+            <a:schemeClr val="lt1"/>
+          </a:fontRef>
+        </p:style>
+        <p:txBody>
+          <a:bodyPr rtlCol="0" anchor="ctr"/>
+          <a:lstStyle/>
+          <a:p>
+            <a:pPr algn="ctr"/>
+            <a:r>
+              <a:rPr lang="en-US" altLang="ko-KR" dirty="0" err="1"/>
+              <a:t>arr</a:t>
+            </a:r>
+            <a:r>
+              <a:rPr lang="en-US" altLang="ko-KR" dirty="0"/>
+              <a:t>     </a:t>
+            </a:r>
+            <a:endParaRPr lang="ko-KR" altLang="en-US" dirty="0"/>
+          </a:p>
+        </p:txBody>
+      </p:sp>
+      <p:sp>
+        <p:nvSpPr>
+          <p:cNvPr id="28" name="직사각형 27">
+            <a:extLst>
+              <a:ext uri="{FF2B5EF4-FFF2-40B4-BE49-F238E27FC236}">
+                <a16:creationId xmlns:a16="http://schemas.microsoft.com/office/drawing/2014/main" id="{8224ECB8-7E33-439C-99B4-A3C3EA4CD17F}"/>
+              </a:ext>
+            </a:extLst>
+          </p:cNvPr>
+          <p:cNvSpPr/>
+          <p:nvPr/>
+        </p:nvSpPr>
+        <p:spPr>
+          <a:xfrm>
+            <a:off x="7294748" y="1539240"/>
+            <a:ext cx="511340" cy="476851"/>
+          </a:xfrm>
+          <a:prstGeom prst="rect">
+            <a:avLst/>
+          </a:prstGeom>
+        </p:spPr>
+        <p:style>
+          <a:lnRef idx="0">
+            <a:schemeClr val="accent6"/>
+          </a:lnRef>
+          <a:fillRef idx="3">
+            <a:schemeClr val="accent6"/>
+          </a:fillRef>
+          <a:effectRef idx="3">
+            <a:schemeClr val="accent6"/>
+          </a:effectRef>
+          <a:fontRef idx="minor">
+            <a:schemeClr val="lt1"/>
+          </a:fontRef>
+        </p:style>
+        <p:txBody>
+          <a:bodyPr rtlCol="0" anchor="ctr"/>
+          <a:lstStyle/>
+          <a:p>
+            <a:pPr algn="ctr"/>
+            <a:r>
+              <a:rPr lang="en-US" altLang="ko-KR" dirty="0"/>
+              <a:t>3</a:t>
+            </a:r>
+            <a:endParaRPr lang="ko-KR" altLang="en-US" dirty="0"/>
+          </a:p>
+        </p:txBody>
+      </p:sp>
+      <p:sp>
+        <p:nvSpPr>
+          <p:cNvPr id="29" name="직사각형 28">
+            <a:extLst>
+              <a:ext uri="{FF2B5EF4-FFF2-40B4-BE49-F238E27FC236}">
+                <a16:creationId xmlns:a16="http://schemas.microsoft.com/office/drawing/2014/main" id="{DB625D02-2BC7-4A6A-91DA-E99A11006371}"/>
+              </a:ext>
+            </a:extLst>
+          </p:cNvPr>
+          <p:cNvSpPr/>
+          <p:nvPr/>
+        </p:nvSpPr>
+        <p:spPr>
+          <a:xfrm>
+            <a:off x="5421834" y="4905678"/>
+            <a:ext cx="794083" cy="789272"/>
+          </a:xfrm>
+          <a:prstGeom prst="rect">
+            <a:avLst/>
+          </a:prstGeom>
+        </p:spPr>
+        <p:style>
+          <a:lnRef idx="0">
+            <a:schemeClr val="accent3"/>
+          </a:lnRef>
+          <a:fillRef idx="3">
+            <a:schemeClr val="accent3"/>
+          </a:fillRef>
+          <a:effectRef idx="3">
+            <a:schemeClr val="accent3"/>
+          </a:effectRef>
+          <a:fontRef idx="minor">
+            <a:schemeClr val="lt1"/>
+          </a:fontRef>
+        </p:style>
+        <p:txBody>
+          <a:bodyPr rtlCol="0" anchor="ctr"/>
+          <a:lstStyle/>
+          <a:p>
+            <a:pPr algn="ctr"/>
+            <a:r>
+              <a:rPr lang="en-US" altLang="ko-KR" dirty="0"/>
+              <a:t>=&gt;</a:t>
+            </a:r>
+            <a:endParaRPr lang="ko-KR" altLang="en-US" dirty="0"/>
+          </a:p>
+        </p:txBody>
+      </p:sp>
+      <p:sp>
+        <p:nvSpPr>
+          <p:cNvPr id="30" name="직사각형 29">
+            <a:extLst>
+              <a:ext uri="{FF2B5EF4-FFF2-40B4-BE49-F238E27FC236}">
+                <a16:creationId xmlns:a16="http://schemas.microsoft.com/office/drawing/2014/main" id="{3F02C638-1493-4CC8-ACA3-A7BDC36F3FFE}"/>
+              </a:ext>
+            </a:extLst>
+          </p:cNvPr>
+          <p:cNvSpPr/>
+          <p:nvPr/>
+        </p:nvSpPr>
+        <p:spPr>
+          <a:xfrm>
+            <a:off x="3755258" y="4905678"/>
+            <a:ext cx="1280160" cy="789272"/>
+          </a:xfrm>
+          <a:prstGeom prst="rect">
+            <a:avLst/>
+          </a:prstGeom>
+          <a:solidFill>
+            <a:schemeClr val="accent1">
+              <a:lumMod val="75000"/>
+            </a:schemeClr>
+          </a:solidFill>
+          <a:effectLst>
+            <a:innerShdw blurRad="114300">
+              <a:prstClr val="black"/>
+            </a:innerShdw>
+          </a:effectLst>
+        </p:spPr>
+        <p:style>
+          <a:lnRef idx="0">
+            <a:schemeClr val="accent6"/>
+          </a:lnRef>
+          <a:fillRef idx="3">
+            <a:schemeClr val="accent6"/>
+          </a:fillRef>
+          <a:effectRef idx="3">
+            <a:schemeClr val="accent6"/>
+          </a:effectRef>
+          <a:fontRef idx="minor">
+            <a:schemeClr val="lt1"/>
+          </a:fontRef>
+        </p:style>
+        <p:txBody>
+          <a:bodyPr rtlCol="0" anchor="ctr"/>
+          <a:lstStyle/>
+          <a:p>
+            <a:pPr algn="ctr"/>
+            <a:endParaRPr lang="ko-KR" altLang="en-US" dirty="0"/>
+          </a:p>
+        </p:txBody>
+      </p:sp>
+      <p:sp>
+        <p:nvSpPr>
+          <p:cNvPr id="31" name="직사각형 30">
+            <a:extLst>
+              <a:ext uri="{FF2B5EF4-FFF2-40B4-BE49-F238E27FC236}">
+                <a16:creationId xmlns:a16="http://schemas.microsoft.com/office/drawing/2014/main" id="{51D20B80-8D12-4BF5-9C2E-ECA5C4D04803}"/>
+              </a:ext>
+            </a:extLst>
+          </p:cNvPr>
+          <p:cNvSpPr/>
+          <p:nvPr/>
+        </p:nvSpPr>
+        <p:spPr>
+          <a:xfrm>
+            <a:off x="949094" y="4905678"/>
+            <a:ext cx="1280160" cy="789272"/>
+          </a:xfrm>
+          <a:prstGeom prst="rect">
+            <a:avLst/>
+          </a:prstGeom>
+          <a:solidFill>
+            <a:schemeClr val="accent1">
+              <a:lumMod val="75000"/>
+            </a:schemeClr>
+          </a:solidFill>
+          <a:effectLst>
+            <a:innerShdw blurRad="114300">
+              <a:prstClr val="black"/>
+            </a:innerShdw>
+          </a:effectLst>
+        </p:spPr>
+        <p:style>
+          <a:lnRef idx="0">
+            <a:schemeClr val="accent6"/>
+          </a:lnRef>
+          <a:fillRef idx="3">
+            <a:schemeClr val="accent6"/>
+          </a:fillRef>
+          <a:effectRef idx="3">
+            <a:schemeClr val="accent6"/>
+          </a:effectRef>
+          <a:fontRef idx="minor">
+            <a:schemeClr val="lt1"/>
+          </a:fontRef>
+        </p:style>
+        <p:txBody>
+          <a:bodyPr rtlCol="0" anchor="ctr"/>
+          <a:lstStyle/>
+          <a:p>
+            <a:pPr algn="ctr"/>
+            <a:endParaRPr lang="ko-KR" altLang="en-US" dirty="0"/>
+          </a:p>
+        </p:txBody>
+      </p:sp>
+      <p:sp>
+        <p:nvSpPr>
+          <p:cNvPr id="32" name="직사각형 31">
+            <a:extLst>
+              <a:ext uri="{FF2B5EF4-FFF2-40B4-BE49-F238E27FC236}">
+                <a16:creationId xmlns:a16="http://schemas.microsoft.com/office/drawing/2014/main" id="{3FE836AE-441D-4524-9F59-D84A609415BA}"/>
+              </a:ext>
+            </a:extLst>
+          </p:cNvPr>
+          <p:cNvSpPr/>
+          <p:nvPr/>
+        </p:nvSpPr>
+        <p:spPr>
+          <a:xfrm>
+            <a:off x="2509940" y="4905678"/>
+            <a:ext cx="858902" cy="789272"/>
+          </a:xfrm>
+          <a:prstGeom prst="rect">
+            <a:avLst/>
+          </a:prstGeom>
+          <a:solidFill>
+            <a:schemeClr val="accent1">
+              <a:lumMod val="75000"/>
+            </a:schemeClr>
+          </a:solidFill>
+          <a:effectLst>
+            <a:innerShdw blurRad="114300">
+              <a:prstClr val="black"/>
+            </a:innerShdw>
+          </a:effectLst>
+        </p:spPr>
+        <p:style>
+          <a:lnRef idx="0">
+            <a:schemeClr val="accent6"/>
+          </a:lnRef>
+          <a:fillRef idx="3">
+            <a:schemeClr val="accent6"/>
+          </a:fillRef>
+          <a:effectRef idx="3">
+            <a:schemeClr val="accent6"/>
+          </a:effectRef>
+          <a:fontRef idx="minor">
+            <a:schemeClr val="lt1"/>
+          </a:fontRef>
+        </p:style>
+        <p:txBody>
+          <a:bodyPr rtlCol="0" anchor="ctr"/>
+          <a:lstStyle/>
+          <a:p>
+            <a:pPr algn="ctr"/>
+            <a:endParaRPr lang="ko-KR" altLang="en-US" dirty="0"/>
+          </a:p>
+        </p:txBody>
+      </p:sp>
+      <p:sp>
+        <p:nvSpPr>
+          <p:cNvPr id="33" name="직사각형 32">
+            <a:extLst>
+              <a:ext uri="{FF2B5EF4-FFF2-40B4-BE49-F238E27FC236}">
+                <a16:creationId xmlns:a16="http://schemas.microsoft.com/office/drawing/2014/main" id="{04EC8E43-C92E-4068-B46F-AEE234DB44A1}"/>
+              </a:ext>
+            </a:extLst>
+          </p:cNvPr>
+          <p:cNvSpPr/>
+          <p:nvPr/>
+        </p:nvSpPr>
+        <p:spPr>
+          <a:xfrm>
+            <a:off x="6525928" y="4905678"/>
+            <a:ext cx="1280160" cy="789272"/>
+          </a:xfrm>
+          <a:prstGeom prst="rect">
+            <a:avLst/>
+          </a:prstGeom>
+          <a:solidFill>
+            <a:schemeClr val="accent1">
+              <a:lumMod val="75000"/>
+            </a:schemeClr>
+          </a:solidFill>
+          <a:effectLst>
+            <a:innerShdw blurRad="114300">
+              <a:prstClr val="black"/>
+            </a:innerShdw>
+          </a:effectLst>
+        </p:spPr>
+        <p:style>
+          <a:lnRef idx="0">
+            <a:schemeClr val="accent6"/>
+          </a:lnRef>
+          <a:fillRef idx="3">
+            <a:schemeClr val="accent6"/>
+          </a:fillRef>
+          <a:effectRef idx="3">
+            <a:schemeClr val="accent6"/>
+          </a:effectRef>
+          <a:fontRef idx="minor">
+            <a:schemeClr val="lt1"/>
+          </a:fontRef>
+        </p:style>
+        <p:txBody>
+          <a:bodyPr rtlCol="0" anchor="ctr"/>
+          <a:lstStyle/>
+          <a:p>
+            <a:pPr algn="ctr"/>
+            <a:endParaRPr lang="ko-KR" altLang="en-US" dirty="0"/>
+          </a:p>
+        </p:txBody>
+      </p:sp>
+      <p:sp>
+        <p:nvSpPr>
+          <p:cNvPr id="34" name="직사각형 33">
+            <a:extLst>
+              <a:ext uri="{FF2B5EF4-FFF2-40B4-BE49-F238E27FC236}">
+                <a16:creationId xmlns:a16="http://schemas.microsoft.com/office/drawing/2014/main" id="{4EBB8257-36AE-4488-994D-5D360A03D7E2}"/>
+              </a:ext>
+            </a:extLst>
+          </p:cNvPr>
+          <p:cNvSpPr/>
+          <p:nvPr/>
+        </p:nvSpPr>
+        <p:spPr>
+          <a:xfrm>
+            <a:off x="9962746" y="5300314"/>
+            <a:ext cx="1280160" cy="789272"/>
+          </a:xfrm>
+          <a:prstGeom prst="rect">
+            <a:avLst/>
+          </a:prstGeom>
+        </p:spPr>
+        <p:style>
+          <a:lnRef idx="0">
+            <a:schemeClr val="accent2"/>
+          </a:lnRef>
+          <a:fillRef idx="3">
+            <a:schemeClr val="accent2"/>
+          </a:fillRef>
+          <a:effectRef idx="3">
+            <a:schemeClr val="accent2"/>
+          </a:effectRef>
+          <a:fontRef idx="minor">
+            <a:schemeClr val="lt1"/>
+          </a:fontRef>
+        </p:style>
+        <p:txBody>
+          <a:bodyPr rtlCol="0" anchor="ctr"/>
+          <a:lstStyle/>
+          <a:p>
+            <a:pPr algn="ctr"/>
+            <a:r>
+              <a:rPr lang="en-US" altLang="ko-KR" dirty="0" err="1"/>
+              <a:t>arr</a:t>
+            </a:r>
+            <a:r>
+              <a:rPr lang="en-US" altLang="ko-KR" dirty="0"/>
+              <a:t>     </a:t>
+            </a:r>
+            <a:endParaRPr lang="ko-KR" altLang="en-US" dirty="0"/>
+          </a:p>
+        </p:txBody>
+      </p:sp>
+      <p:sp>
+        <p:nvSpPr>
+          <p:cNvPr id="35" name="직사각형 34">
+            <a:extLst>
+              <a:ext uri="{FF2B5EF4-FFF2-40B4-BE49-F238E27FC236}">
+                <a16:creationId xmlns:a16="http://schemas.microsoft.com/office/drawing/2014/main" id="{D5C6F162-4A11-4128-BF95-4E13E1A09CC7}"/>
+              </a:ext>
+            </a:extLst>
+          </p:cNvPr>
+          <p:cNvSpPr/>
+          <p:nvPr/>
+        </p:nvSpPr>
+        <p:spPr>
+          <a:xfrm>
+            <a:off x="10850473" y="5474369"/>
+            <a:ext cx="511340" cy="476851"/>
+          </a:xfrm>
+          <a:prstGeom prst="rect">
+            <a:avLst/>
+          </a:prstGeom>
+        </p:spPr>
+        <p:style>
+          <a:lnRef idx="0">
+            <a:schemeClr val="accent6"/>
+          </a:lnRef>
+          <a:fillRef idx="3">
+            <a:schemeClr val="accent6"/>
+          </a:fillRef>
+          <a:effectRef idx="3">
+            <a:schemeClr val="accent6"/>
+          </a:effectRef>
+          <a:fontRef idx="minor">
+            <a:schemeClr val="lt1"/>
+          </a:fontRef>
+        </p:style>
+        <p:txBody>
+          <a:bodyPr rtlCol="0" anchor="ctr"/>
+          <a:lstStyle/>
+          <a:p>
+            <a:pPr algn="ctr"/>
+            <a:r>
+              <a:rPr lang="en-US" altLang="ko-KR" dirty="0"/>
+              <a:t>3</a:t>
+            </a:r>
+            <a:endParaRPr lang="ko-KR" altLang="en-US" dirty="0"/>
+          </a:p>
+        </p:txBody>
+      </p:sp>
+      <p:sp>
+        <p:nvSpPr>
+          <p:cNvPr id="36" name="직사각형 35">
+            <a:extLst>
+              <a:ext uri="{FF2B5EF4-FFF2-40B4-BE49-F238E27FC236}">
+                <a16:creationId xmlns:a16="http://schemas.microsoft.com/office/drawing/2014/main" id="{CF58F3D8-38E6-42DB-AADC-A73AF1ED3844}"/>
+              </a:ext>
+            </a:extLst>
+          </p:cNvPr>
+          <p:cNvSpPr/>
+          <p:nvPr/>
+        </p:nvSpPr>
+        <p:spPr>
+          <a:xfrm>
+            <a:off x="10210393" y="3295849"/>
+            <a:ext cx="1280160" cy="789272"/>
+          </a:xfrm>
+          <a:prstGeom prst="rect">
+            <a:avLst/>
+          </a:prstGeom>
+        </p:spPr>
+        <p:style>
+          <a:lnRef idx="0">
+            <a:schemeClr val="accent6"/>
+          </a:lnRef>
+          <a:fillRef idx="3">
+            <a:schemeClr val="accent6"/>
+          </a:fillRef>
+          <a:effectRef idx="3">
+            <a:schemeClr val="accent6"/>
+          </a:effectRef>
+          <a:fontRef idx="minor">
+            <a:schemeClr val="lt1"/>
+          </a:fontRef>
+        </p:style>
+        <p:txBody>
+          <a:bodyPr rtlCol="0" anchor="ctr"/>
+          <a:lstStyle/>
+          <a:p>
+            <a:pPr algn="ctr"/>
+            <a:r>
+              <a:rPr lang="en-US" altLang="ko-KR" dirty="0"/>
+              <a:t>3</a:t>
+            </a:r>
+            <a:endParaRPr lang="ko-KR" altLang="en-US" dirty="0"/>
+          </a:p>
+        </p:txBody>
+      </p:sp>
+      <p:sp>
+        <p:nvSpPr>
+          <p:cNvPr id="37" name="직사각형 36">
+            <a:extLst>
+              <a:ext uri="{FF2B5EF4-FFF2-40B4-BE49-F238E27FC236}">
+                <a16:creationId xmlns:a16="http://schemas.microsoft.com/office/drawing/2014/main" id="{D4C7F977-6175-40BF-9636-17FFF34A8151}"/>
+              </a:ext>
+            </a:extLst>
+          </p:cNvPr>
+          <p:cNvSpPr/>
+          <p:nvPr/>
+        </p:nvSpPr>
+        <p:spPr>
+          <a:xfrm>
+            <a:off x="8401900" y="4327758"/>
+            <a:ext cx="1280160" cy="789272"/>
+          </a:xfrm>
+          <a:prstGeom prst="rect">
+            <a:avLst/>
+          </a:prstGeom>
+        </p:spPr>
+        <p:style>
+          <a:lnRef idx="0">
+            <a:schemeClr val="accent4"/>
+          </a:lnRef>
+          <a:fillRef idx="3">
+            <a:schemeClr val="accent4"/>
+          </a:fillRef>
+          <a:effectRef idx="3">
+            <a:schemeClr val="accent4"/>
+          </a:effectRef>
+          <a:fontRef idx="minor">
+            <a:schemeClr val="lt1"/>
+          </a:fontRef>
+        </p:style>
+        <p:txBody>
+          <a:bodyPr rtlCol="0" anchor="ctr"/>
+          <a:lstStyle/>
+          <a:p>
+            <a:pPr algn="ctr"/>
+            <a:r>
+              <a:rPr lang="en-US" altLang="ko-KR" dirty="0"/>
+              <a:t>A</a:t>
+            </a:r>
+            <a:endParaRPr lang="ko-KR" altLang="en-US" dirty="0"/>
+          </a:p>
+        </p:txBody>
+      </p:sp>
+      <p:sp>
+        <p:nvSpPr>
+          <p:cNvPr id="3" name="TextBox 2">
+            <a:extLst>
+              <a:ext uri="{FF2B5EF4-FFF2-40B4-BE49-F238E27FC236}">
+                <a16:creationId xmlns:a16="http://schemas.microsoft.com/office/drawing/2014/main" id="{CA5A6317-0FE6-4703-89E6-A10983654555}"/>
               </a:ext>
             </a:extLst>
           </p:cNvPr>
@@ -5347,8 +6410,8 @@
         </p:nvSpPr>
         <p:spPr>
           <a:xfrm>
-            <a:off x="5739865" y="4126165"/>
-            <a:ext cx="5622052" cy="3139321"/>
+            <a:off x="587141" y="522613"/>
+            <a:ext cx="2529860" cy="369332"/>
           </a:xfrm>
           <a:prstGeom prst="rect">
             <a:avLst/>
@@ -5362,145 +6425,45 @@
           <a:lstStyle/>
           <a:p>
             <a:r>
-              <a:rPr lang="ko-KR" altLang="en-US" dirty="0"/>
-              <a:t>아예 이런 형식은 어떨까</a:t>
-            </a:r>
-            <a:endParaRPr lang="en-US" altLang="ko-KR" dirty="0"/>
-          </a:p>
-          <a:p>
-            <a:endParaRPr lang="en-US" altLang="ko-KR" dirty="0"/>
-          </a:p>
-          <a:p>
-            <a:r>
               <a:rPr lang="en-US" altLang="ko-KR" dirty="0"/>
-              <a:t>condition block</a:t>
-            </a:r>
-            <a:r>
-              <a:rPr lang="ko-KR" altLang="en-US" dirty="0"/>
-              <a:t>은 </a:t>
-            </a:r>
-            <a:r>
-              <a:rPr lang="en-US" altLang="ko-KR" dirty="0"/>
-              <a:t>while</a:t>
-            </a:r>
-            <a:r>
-              <a:rPr lang="ko-KR" altLang="en-US" dirty="0"/>
-              <a:t>문 </a:t>
-            </a:r>
-            <a:r>
-              <a:rPr lang="en-US" altLang="ko-KR" dirty="0"/>
-              <a:t>/ if</a:t>
-            </a:r>
-            <a:r>
-              <a:rPr lang="ko-KR" altLang="en-US" dirty="0"/>
-              <a:t>문의 조건으로</a:t>
-            </a:r>
-            <a:endParaRPr lang="en-US" altLang="ko-KR" dirty="0"/>
-          </a:p>
-          <a:p>
-            <a:r>
-              <a:rPr lang="ko-KR" altLang="en-US" dirty="0"/>
-              <a:t>종속적이어야 하니까 </a:t>
-            </a:r>
-            <a:r>
-              <a:rPr lang="en-US" altLang="ko-KR" dirty="0"/>
-              <a:t>while/if</a:t>
-            </a:r>
-            <a:r>
-              <a:rPr lang="ko-KR" altLang="en-US" dirty="0"/>
-              <a:t> </a:t>
-            </a:r>
-            <a:r>
-              <a:rPr lang="en-US" altLang="ko-KR" dirty="0"/>
-              <a:t>block </a:t>
-            </a:r>
-            <a:r>
-              <a:rPr lang="ko-KR" altLang="en-US" dirty="0"/>
-              <a:t>자체에 </a:t>
-            </a:r>
-            <a:endParaRPr lang="en-US" altLang="ko-KR" dirty="0"/>
-          </a:p>
-          <a:p>
-            <a:r>
-              <a:rPr lang="en-US" altLang="ko-KR" dirty="0"/>
-              <a:t>blank </a:t>
-            </a:r>
-            <a:r>
-              <a:rPr lang="ko-KR" altLang="en-US" dirty="0"/>
-              <a:t>공간을 두고 </a:t>
-            </a:r>
-            <a:r>
-              <a:rPr lang="en-US" altLang="ko-KR" dirty="0"/>
-              <a:t>condition block</a:t>
-            </a:r>
-            <a:r>
-              <a:rPr lang="ko-KR" altLang="en-US" dirty="0"/>
-              <a:t>을 채워버리도록</a:t>
-            </a:r>
-            <a:endParaRPr lang="en-US" altLang="ko-KR" dirty="0"/>
-          </a:p>
-          <a:p>
-            <a:r>
-              <a:rPr lang="en-US" altLang="ko-KR" dirty="0"/>
-              <a:t>(4)-&gt; condition</a:t>
-            </a:r>
-            <a:r>
-              <a:rPr lang="ko-KR" altLang="en-US" dirty="0"/>
-              <a:t>을 아직 설치안한 </a:t>
-            </a:r>
-            <a:r>
-              <a:rPr lang="en-US" altLang="ko-KR" dirty="0"/>
-              <a:t>while block</a:t>
-            </a:r>
-          </a:p>
-          <a:p>
-            <a:endParaRPr lang="en-US" altLang="ko-KR" dirty="0"/>
-          </a:p>
-          <a:p>
-            <a:r>
-              <a:rPr lang="ko-KR" altLang="en-US" dirty="0"/>
-              <a:t>그런데 </a:t>
-            </a:r>
-            <a:r>
-              <a:rPr lang="en-US" altLang="ko-KR" dirty="0"/>
-              <a:t>if</a:t>
-            </a:r>
-            <a:r>
-              <a:rPr lang="ko-KR" altLang="en-US" dirty="0" err="1"/>
-              <a:t>문이랑</a:t>
-            </a:r>
-            <a:r>
-              <a:rPr lang="ko-KR" altLang="en-US" dirty="0"/>
-              <a:t> </a:t>
-            </a:r>
-            <a:r>
-              <a:rPr lang="en-US" altLang="ko-KR" dirty="0"/>
-              <a:t>while</a:t>
-            </a:r>
-            <a:r>
-              <a:rPr lang="ko-KR" altLang="en-US" dirty="0"/>
-              <a:t>문의 차이가 </a:t>
-            </a:r>
-            <a:endParaRPr lang="en-US" altLang="ko-KR" dirty="0"/>
-          </a:p>
-          <a:p>
-            <a:r>
-              <a:rPr lang="en-US" altLang="ko-KR" dirty="0"/>
-              <a:t>while</a:t>
-            </a:r>
-            <a:r>
-              <a:rPr lang="ko-KR" altLang="en-US" dirty="0"/>
-              <a:t>문은 들어오는 라인 두개라는 것 밖에 없는 듯</a:t>
-            </a:r>
-            <a:r>
-              <a:rPr lang="en-US" altLang="ko-KR" dirty="0"/>
-              <a:t>…</a:t>
-            </a:r>
-          </a:p>
-          <a:p>
-            <a:endParaRPr lang="en-US" altLang="ko-KR" dirty="0"/>
-          </a:p>
-          <a:p>
+              <a:t>Arithmetic assignment</a:t>
+            </a:r>
+            <a:endParaRPr lang="ko-KR" altLang="en-US" dirty="0"/>
+          </a:p>
+        </p:txBody>
+      </p:sp>
+      <p:sp>
+        <p:nvSpPr>
+          <p:cNvPr id="38" name="TextBox 37">
+            <a:extLst>
+              <a:ext uri="{FF2B5EF4-FFF2-40B4-BE49-F238E27FC236}">
+                <a16:creationId xmlns:a16="http://schemas.microsoft.com/office/drawing/2014/main" id="{3FF2C900-553A-498D-BB41-3D3EE4104EF6}"/>
+              </a:ext>
+            </a:extLst>
+          </p:cNvPr>
+          <p:cNvSpPr txBox="1"/>
+          <p:nvPr/>
+        </p:nvSpPr>
+        <p:spPr>
+          <a:xfrm>
+            <a:off x="475749" y="3959197"/>
+            <a:ext cx="2529860" cy="369332"/>
+          </a:xfrm>
+          <a:prstGeom prst="rect">
+            <a:avLst/>
+          </a:prstGeom>
+          <a:noFill/>
+        </p:spPr>
+        <p:txBody>
+          <a:bodyPr wrap="none" rtlCol="0">
+            <a:spAutoFit/>
+          </a:bodyPr>
+          <a:lstStyle/>
+          <a:p>
+            <a:r>
+              <a:rPr lang="en-US" altLang="ko-KR"/>
+              <a:t>Arithmetic assignment</a:t>
+            </a:r>
             <a:endParaRPr lang="ko-KR" altLang="en-US" dirty="0"/>
           </a:p>
         </p:txBody>
@@ -5508,7 +6471,7 @@
     </p:spTree>
     <p:extLst>
       <p:ext uri="{BB962C8B-B14F-4D97-AF65-F5344CB8AC3E}">
-        <p14:creationId xmlns:p14="http://schemas.microsoft.com/office/powerpoint/2010/main" val="4173780711"/>
+        <p14:creationId xmlns:p14="http://schemas.microsoft.com/office/powerpoint/2010/main" val="3727046065"/>
       </p:ext>
     </p:extLst>
   </p:cSld>

</xml_diff>